<commit_message>
Data extraction from PDFs and display of entities in text in displaCy.
</commit_message>
<xml_diff>
--- a/project/Project.pptx
+++ b/project/Project.pptx
@@ -6,6 +6,10 @@
   </p:sldMasterIdLst>
   <p:sldIdLst>
     <p:sldId id="258" r:id="rId2"/>
+    <p:sldId id="261" r:id="rId3"/>
+    <p:sldId id="262" r:id="rId4"/>
+    <p:sldId id="260" r:id="rId5"/>
+    <p:sldId id="259" r:id="rId6"/>
   </p:sldIdLst>
   <p:sldSz cx="9906000" cy="6858000" type="A4"/>
   <p:notesSz cx="6858000" cy="9144000"/>
@@ -2985,7 +2989,7 @@
         </p:nvSpPr>
         <p:spPr>
           <a:xfrm>
-            <a:off x="185760" y="225249"/>
+            <a:off x="190156" y="88968"/>
             <a:ext cx="9352657" cy="523220"/>
           </a:xfrm>
           <a:prstGeom prst="rect">
@@ -3033,8 +3037,8 @@
         </p:nvSpPr>
         <p:spPr>
           <a:xfrm>
-            <a:off x="769327" y="1292468"/>
-            <a:ext cx="8721969" cy="5218236"/>
+            <a:off x="417635" y="819882"/>
+            <a:ext cx="9315451" cy="5682030"/>
           </a:xfrm>
           <a:prstGeom prst="rect">
             <a:avLst/>
@@ -3282,8 +3286,75 @@
             </a:r>
             <a:r>
               <a:rPr lang="en-US" dirty="0"/>
-              <a:t>from the sentences in each cluster</a:t>
-            </a:r>
+              <a:t>from the sentences </a:t>
+            </a:r>
+            <a:r>
+              <a:rPr lang="en-US" b="1" dirty="0"/>
+              <a:t>in each cluster</a:t>
+            </a:r>
+          </a:p>
+          <a:p>
+            <a:pPr marL="800100" lvl="1" indent="-342900">
+              <a:buFont typeface="+mj-lt"/>
+              <a:buAutoNum type="alphaLcPeriod"/>
+            </a:pPr>
+            <a:r>
+              <a:rPr lang="en-US" dirty="0"/>
+              <a:t>Attach </a:t>
+            </a:r>
+            <a:r>
+              <a:rPr lang="en-US" dirty="0" err="1">
+                <a:highlight>
+                  <a:srgbClr val="00FFFF"/>
+                </a:highlight>
+              </a:rPr>
+              <a:t>sentence_vector</a:t>
+            </a:r>
+            <a:r>
+              <a:rPr lang="en-US" dirty="0">
+                <a:highlight>
+                  <a:srgbClr val="00FFFF"/>
+                </a:highlight>
+              </a:rPr>
+              <a:t> </a:t>
+            </a:r>
+            <a:r>
+              <a:rPr lang="en-US" dirty="0"/>
+              <a:t>to Relationship: i.e. </a:t>
+            </a:r>
+            <a:r>
+              <a:rPr lang="en-US" b="1" dirty="0"/>
+              <a:t>“ </a:t>
+            </a:r>
+            <a:r>
+              <a:rPr lang="en-US" b="1" dirty="0">
+                <a:highlight>
+                  <a:srgbClr val="00FFFF"/>
+                </a:highlight>
+              </a:rPr>
+              <a:t>-[:EMITTED {vector: </a:t>
+            </a:r>
+            <a:r>
+              <a:rPr lang="en-US" b="1" dirty="0" err="1">
+                <a:highlight>
+                  <a:srgbClr val="00FFFF"/>
+                </a:highlight>
+              </a:rPr>
+              <a:t>sent_vector</a:t>
+            </a:r>
+            <a:r>
+              <a:rPr lang="en-US" b="1" dirty="0">
+                <a:highlight>
+                  <a:srgbClr val="00FFFF"/>
+                </a:highlight>
+              </a:rPr>
+              <a:t>}]-&gt; </a:t>
+            </a:r>
+            <a:r>
+              <a:rPr lang="en-US" b="1" dirty="0"/>
+              <a:t>” </a:t>
+            </a:r>
+            <a:endParaRPr lang="en-US" dirty="0"/>
           </a:p>
           <a:p>
             <a:pPr marL="800100" lvl="1" indent="-342900">
@@ -3302,16 +3373,17 @@
               <a:t>Feed </a:t>
             </a:r>
             <a:r>
-              <a:rPr lang="en-US" dirty="0" err="1"/>
+              <a:rPr lang="en-US" b="1" dirty="0" err="1"/>
               <a:t>neo4j</a:t>
             </a:r>
             <a:r>
+              <a:rPr lang="en-US" b="1" dirty="0"/>
+              <a:t> database </a:t>
+            </a:r>
+            <a:r>
               <a:rPr lang="en-US" dirty="0"/>
-              <a:t> database with:</a:t>
-            </a:r>
-          </a:p>
-          <a:p>
-            <a:pPr lvl="1"/>
+              <a:t>with: </a:t>
+            </a:r>
             <a:r>
               <a:rPr lang="en-US" dirty="0">
                 <a:highlight>
@@ -3330,7 +3402,23 @@
                   <a:srgbClr val="00FFFF"/>
                 </a:highlight>
               </a:rPr>
-              <a:t>-[:RELATION TAG] -&gt;</a:t>
+              <a:t>-[:RELATION TAG {vector: </a:t>
+            </a:r>
+            <a:r>
+              <a:rPr lang="en-US" dirty="0" err="1">
+                <a:highlight>
+                  <a:srgbClr val="00FFFF"/>
+                </a:highlight>
+              </a:rPr>
+              <a:t>sent_vector</a:t>
+            </a:r>
+            <a:r>
+              <a:rPr lang="en-US" dirty="0">
+                <a:highlight>
+                  <a:srgbClr val="00FFFF"/>
+                </a:highlight>
+              </a:rPr>
+              <a:t>}] -&gt;</a:t>
             </a:r>
             <a:r>
               <a:rPr lang="en-US" dirty="0"/>
@@ -3346,6 +3434,82 @@
             </a:r>
           </a:p>
           <a:p>
+            <a:endParaRPr lang="en-US" dirty="0">
+              <a:highlight>
+                <a:srgbClr val="FFFF00"/>
+              </a:highlight>
+            </a:endParaRPr>
+          </a:p>
+          <a:p>
+            <a:pPr marL="342900" indent="-342900">
+              <a:buFont typeface="+mj-lt"/>
+              <a:buAutoNum type="arabicPeriod" startAt="5"/>
+            </a:pPr>
+            <a:r>
+              <a:rPr lang="en-US" dirty="0"/>
+              <a:t>Query: Find </a:t>
+            </a:r>
+            <a:r>
+              <a:rPr lang="en-US" dirty="0">
+                <a:highlight>
+                  <a:srgbClr val="00FFFF"/>
+                </a:highlight>
+              </a:rPr>
+              <a:t>-[:RELATION TAG {vector: </a:t>
+            </a:r>
+            <a:r>
+              <a:rPr lang="en-US" dirty="0" err="1">
+                <a:highlight>
+                  <a:srgbClr val="00FFFF"/>
+                </a:highlight>
+              </a:rPr>
+              <a:t>sent_vector</a:t>
+            </a:r>
+            <a:r>
+              <a:rPr lang="en-US" dirty="0">
+                <a:highlight>
+                  <a:srgbClr val="00FFFF"/>
+                </a:highlight>
+              </a:rPr>
+              <a:t>}] -&gt;</a:t>
+            </a:r>
+            <a:r>
+              <a:rPr lang="en-US" dirty="0"/>
+              <a:t>   </a:t>
+            </a:r>
+            <a:r>
+              <a:rPr lang="en-US" b="1" u="sng" dirty="0">
+                <a:solidFill>
+                  <a:srgbClr val="13DD13"/>
+                </a:solidFill>
+              </a:rPr>
+              <a:t>similar to</a:t>
+            </a:r>
+            <a:r>
+              <a:rPr lang="en-US" dirty="0"/>
+              <a:t>  </a:t>
+            </a:r>
+            <a:r>
+              <a:rPr lang="en-US" dirty="0">
+                <a:highlight>
+                  <a:srgbClr val="FF00FF"/>
+                </a:highlight>
+              </a:rPr>
+              <a:t>Question sentence vector </a:t>
+            </a:r>
+          </a:p>
+          <a:p>
+            <a:pPr lvl="1"/>
+            <a:r>
+              <a:rPr lang="en-US" dirty="0">
+                <a:highlight>
+                  <a:srgbClr val="FFFF00"/>
+                </a:highlight>
+              </a:rPr>
+              <a:t>		</a:t>
+            </a:r>
+          </a:p>
+          <a:p>
             <a:pPr marL="800100" lvl="1" indent="-342900">
               <a:buFont typeface="+mj-lt"/>
               <a:buAutoNum type="alphaLcPeriod"/>
@@ -3371,6 +3535,1050 @@
     <p:extLst>
       <p:ext uri="{BB962C8B-B14F-4D97-AF65-F5344CB8AC3E}">
         <p14:creationId xmlns:p14="http://schemas.microsoft.com/office/powerpoint/2010/main" val="18948563"/>
+      </p:ext>
+    </p:extLst>
+  </p:cSld>
+  <p:clrMapOvr>
+    <a:masterClrMapping/>
+  </p:clrMapOvr>
+</p:sld>
+</file>
+
+<file path=ppt/slides/slide2.xml><?xml version="1.0" encoding="utf-8"?>
+<p:sld xmlns:a="http://schemas.openxmlformats.org/drawingml/2006/main" xmlns:r="http://schemas.openxmlformats.org/officeDocument/2006/relationships" xmlns:p="http://schemas.openxmlformats.org/presentationml/2006/main" show="0">
+  <p:cSld>
+    <p:spTree>
+      <p:nvGrpSpPr>
+        <p:cNvPr id="1" name=""/>
+        <p:cNvGrpSpPr/>
+        <p:nvPr/>
+      </p:nvGrpSpPr>
+      <p:grpSpPr>
+        <a:xfrm>
+          <a:off x="0" y="0"/>
+          <a:ext cx="0" cy="0"/>
+          <a:chOff x="0" y="0"/>
+          <a:chExt cx="0" cy="0"/>
+        </a:xfrm>
+      </p:grpSpPr>
+      <p:sp>
+        <p:nvSpPr>
+          <p:cNvPr id="26" name="Textfeld 25">
+            <a:extLst>
+              <a:ext uri="{FF2B5EF4-FFF2-40B4-BE49-F238E27FC236}">
+                <a16:creationId xmlns:a16="http://schemas.microsoft.com/office/drawing/2014/main" id="{E5229098-1146-2BBD-D75D-639ED2A05A0D}"/>
+              </a:ext>
+            </a:extLst>
+          </p:cNvPr>
+          <p:cNvSpPr txBox="1"/>
+          <p:nvPr/>
+        </p:nvSpPr>
+        <p:spPr>
+          <a:xfrm>
+            <a:off x="190156" y="88968"/>
+            <a:ext cx="9352657" cy="523220"/>
+          </a:xfrm>
+          <a:prstGeom prst="rect">
+            <a:avLst/>
+          </a:prstGeom>
+          <a:noFill/>
+        </p:spPr>
+        <p:txBody>
+          <a:bodyPr wrap="square" rtlCol="0">
+            <a:spAutoFit/>
+          </a:bodyPr>
+          <a:lstStyle/>
+          <a:p>
+            <a:pPr algn="ctr"/>
+            <a:r>
+              <a:rPr lang="en-US" sz="2800" b="1" dirty="0" err="1"/>
+              <a:t>UASFRA</a:t>
+            </a:r>
+            <a:r>
+              <a:rPr lang="en-US" sz="2800" b="1" dirty="0"/>
+              <a:t>-MS-</a:t>
+            </a:r>
+            <a:r>
+              <a:rPr lang="en-US" sz="2800" b="1" dirty="0" err="1"/>
+              <a:t>PROJDIGI</a:t>
+            </a:r>
+            <a:r>
+              <a:rPr lang="en-US" sz="2800" b="1" dirty="0"/>
+              <a:t>: Group 4: The plan ahead</a:t>
+            </a:r>
+          </a:p>
+        </p:txBody>
+      </p:sp>
+      <p:pic>
+        <p:nvPicPr>
+          <p:cNvPr id="3074" name="Picture 2">
+            <a:extLst>
+              <a:ext uri="{FF2B5EF4-FFF2-40B4-BE49-F238E27FC236}">
+                <a16:creationId xmlns:a16="http://schemas.microsoft.com/office/drawing/2014/main" id="{5450B4E5-1CE4-3BD6-A20E-FE76AF0FC57E}"/>
+              </a:ext>
+            </a:extLst>
+          </p:cNvPr>
+          <p:cNvPicPr>
+            <a:picLocks noChangeAspect="1" noChangeArrowheads="1"/>
+          </p:cNvPicPr>
+          <p:nvPr/>
+        </p:nvPicPr>
+        <p:blipFill>
+          <a:blip r:embed="rId2">
+            <a:extLst>
+              <a:ext uri="{28A0092B-C50C-407E-A947-70E740481C1C}">
+                <a14:useLocalDpi xmlns:a14="http://schemas.microsoft.com/office/drawing/2010/main" val="0"/>
+              </a:ext>
+            </a:extLst>
+          </a:blip>
+          <a:srcRect/>
+          <a:stretch>
+            <a:fillRect/>
+          </a:stretch>
+        </p:blipFill>
+        <p:spPr bwMode="auto">
+          <a:xfrm>
+            <a:off x="2313476" y="1508248"/>
+            <a:ext cx="5191125" cy="2619375"/>
+          </a:xfrm>
+          <a:prstGeom prst="rect">
+            <a:avLst/>
+          </a:prstGeom>
+          <a:noFill/>
+          <a:extLst>
+            <a:ext uri="{909E8E84-426E-40DD-AFC4-6F175D3DCCD1}">
+              <a14:hiddenFill xmlns:a14="http://schemas.microsoft.com/office/drawing/2010/main">
+                <a:solidFill>
+                  <a:srgbClr val="FFFFFF"/>
+                </a:solidFill>
+              </a14:hiddenFill>
+            </a:ext>
+          </a:extLst>
+        </p:spPr>
+      </p:pic>
+    </p:spTree>
+    <p:extLst>
+      <p:ext uri="{BB962C8B-B14F-4D97-AF65-F5344CB8AC3E}">
+        <p14:creationId xmlns:p14="http://schemas.microsoft.com/office/powerpoint/2010/main" val="2012503455"/>
+      </p:ext>
+    </p:extLst>
+  </p:cSld>
+  <p:clrMapOvr>
+    <a:masterClrMapping/>
+  </p:clrMapOvr>
+</p:sld>
+</file>
+
+<file path=ppt/slides/slide3.xml><?xml version="1.0" encoding="utf-8"?>
+<p:sld xmlns:a="http://schemas.openxmlformats.org/drawingml/2006/main" xmlns:r="http://schemas.openxmlformats.org/officeDocument/2006/relationships" xmlns:p="http://schemas.openxmlformats.org/presentationml/2006/main" show="0">
+  <p:cSld>
+    <p:spTree>
+      <p:nvGrpSpPr>
+        <p:cNvPr id="1" name=""/>
+        <p:cNvGrpSpPr/>
+        <p:nvPr/>
+      </p:nvGrpSpPr>
+      <p:grpSpPr>
+        <a:xfrm>
+          <a:off x="0" y="0"/>
+          <a:ext cx="0" cy="0"/>
+          <a:chOff x="0" y="0"/>
+          <a:chExt cx="0" cy="0"/>
+        </a:xfrm>
+      </p:grpSpPr>
+      <p:sp>
+        <p:nvSpPr>
+          <p:cNvPr id="26" name="Textfeld 25">
+            <a:extLst>
+              <a:ext uri="{FF2B5EF4-FFF2-40B4-BE49-F238E27FC236}">
+                <a16:creationId xmlns:a16="http://schemas.microsoft.com/office/drawing/2014/main" id="{E5229098-1146-2BBD-D75D-639ED2A05A0D}"/>
+              </a:ext>
+            </a:extLst>
+          </p:cNvPr>
+          <p:cNvSpPr txBox="1"/>
+          <p:nvPr/>
+        </p:nvSpPr>
+        <p:spPr>
+          <a:xfrm>
+            <a:off x="190156" y="88968"/>
+            <a:ext cx="9352657" cy="523220"/>
+          </a:xfrm>
+          <a:prstGeom prst="rect">
+            <a:avLst/>
+          </a:prstGeom>
+          <a:noFill/>
+        </p:spPr>
+        <p:txBody>
+          <a:bodyPr wrap="square" rtlCol="0">
+            <a:spAutoFit/>
+          </a:bodyPr>
+          <a:lstStyle/>
+          <a:p>
+            <a:pPr algn="ctr"/>
+            <a:r>
+              <a:rPr lang="en-US" sz="2800" b="1" dirty="0" err="1"/>
+              <a:t>spaCy</a:t>
+            </a:r>
+            <a:endParaRPr lang="en-US" sz="2800" b="1" dirty="0"/>
+          </a:p>
+        </p:txBody>
+      </p:sp>
+      <p:pic>
+        <p:nvPicPr>
+          <p:cNvPr id="2" name="Grafik 1">
+            <a:extLst>
+              <a:ext uri="{FF2B5EF4-FFF2-40B4-BE49-F238E27FC236}">
+                <a16:creationId xmlns:a16="http://schemas.microsoft.com/office/drawing/2014/main" id="{874ADAFB-B18D-3ED4-390C-3B56C1AD65B3}"/>
+              </a:ext>
+            </a:extLst>
+          </p:cNvPr>
+          <p:cNvPicPr>
+            <a:picLocks noChangeAspect="1"/>
+          </p:cNvPicPr>
+          <p:nvPr/>
+        </p:nvPicPr>
+        <p:blipFill>
+          <a:blip r:embed="rId2"/>
+          <a:stretch>
+            <a:fillRect/>
+          </a:stretch>
+        </p:blipFill>
+        <p:spPr>
+          <a:xfrm>
+            <a:off x="1219200" y="1180733"/>
+            <a:ext cx="7124700" cy="1533525"/>
+          </a:xfrm>
+          <a:prstGeom prst="rect">
+            <a:avLst/>
+          </a:prstGeom>
+        </p:spPr>
+      </p:pic>
+      <p:pic>
+        <p:nvPicPr>
+          <p:cNvPr id="6" name="Grafik 5" descr="Fragezeichen mit einfarbiger Füllung">
+            <a:extLst>
+              <a:ext uri="{FF2B5EF4-FFF2-40B4-BE49-F238E27FC236}">
+                <a16:creationId xmlns:a16="http://schemas.microsoft.com/office/drawing/2014/main" id="{B3EFCB69-1065-3546-F96C-DF5A9A953D83}"/>
+              </a:ext>
+            </a:extLst>
+          </p:cNvPr>
+          <p:cNvPicPr>
+            <a:picLocks noChangeAspect="1"/>
+          </p:cNvPicPr>
+          <p:nvPr/>
+        </p:nvPicPr>
+        <p:blipFill>
+          <a:blip r:embed="rId3">
+            <a:extLst>
+              <a:ext uri="{28A0092B-C50C-407E-A947-70E740481C1C}">
+                <a14:useLocalDpi xmlns:a14="http://schemas.microsoft.com/office/drawing/2010/main" val="0"/>
+              </a:ext>
+              <a:ext uri="{96DAC541-7B7A-43D3-8B79-37D633B846F1}">
+                <asvg:svgBlip xmlns:asvg="http://schemas.microsoft.com/office/drawing/2016/SVG/main" r:embed="rId4"/>
+              </a:ext>
+            </a:extLst>
+          </a:blip>
+          <a:stretch>
+            <a:fillRect/>
+          </a:stretch>
+        </p:blipFill>
+        <p:spPr>
+          <a:xfrm>
+            <a:off x="3994638" y="2368403"/>
+            <a:ext cx="914400" cy="914400"/>
+          </a:xfrm>
+          <a:prstGeom prst="rect">
+            <a:avLst/>
+          </a:prstGeom>
+        </p:spPr>
+      </p:pic>
+      <p:sp>
+        <p:nvSpPr>
+          <p:cNvPr id="7" name="Multiplikationszeichen 6">
+            <a:extLst>
+              <a:ext uri="{FF2B5EF4-FFF2-40B4-BE49-F238E27FC236}">
+                <a16:creationId xmlns:a16="http://schemas.microsoft.com/office/drawing/2014/main" id="{16F0A049-77D0-33F6-B3A5-9A345008BF1B}"/>
+              </a:ext>
+            </a:extLst>
+          </p:cNvPr>
+          <p:cNvSpPr/>
+          <p:nvPr/>
+        </p:nvSpPr>
+        <p:spPr>
+          <a:xfrm>
+            <a:off x="7200900" y="1414493"/>
+            <a:ext cx="1208943" cy="1411110"/>
+          </a:xfrm>
+          <a:prstGeom prst="mathMultiply">
+            <a:avLst/>
+          </a:prstGeom>
+          <a:solidFill>
+            <a:srgbClr val="FF0000"/>
+          </a:solidFill>
+        </p:spPr>
+        <p:style>
+          <a:lnRef idx="2">
+            <a:schemeClr val="accent1">
+              <a:shade val="15000"/>
+            </a:schemeClr>
+          </a:lnRef>
+          <a:fillRef idx="1">
+            <a:schemeClr val="accent1"/>
+          </a:fillRef>
+          <a:effectRef idx="0">
+            <a:schemeClr val="accent1"/>
+          </a:effectRef>
+          <a:fontRef idx="minor">
+            <a:schemeClr val="lt1"/>
+          </a:fontRef>
+        </p:style>
+        <p:txBody>
+          <a:bodyPr rtlCol="0" anchor="ctr"/>
+          <a:lstStyle/>
+          <a:p>
+            <a:pPr algn="ctr"/>
+            <a:endParaRPr lang="en-US"/>
+          </a:p>
+        </p:txBody>
+      </p:sp>
+    </p:spTree>
+    <p:extLst>
+      <p:ext uri="{BB962C8B-B14F-4D97-AF65-F5344CB8AC3E}">
+        <p14:creationId xmlns:p14="http://schemas.microsoft.com/office/powerpoint/2010/main" val="783836180"/>
+      </p:ext>
+    </p:extLst>
+  </p:cSld>
+  <p:clrMapOvr>
+    <a:masterClrMapping/>
+  </p:clrMapOvr>
+</p:sld>
+</file>
+
+<file path=ppt/slides/slide4.xml><?xml version="1.0" encoding="utf-8"?>
+<p:sld xmlns:a="http://schemas.openxmlformats.org/drawingml/2006/main" xmlns:r="http://schemas.openxmlformats.org/officeDocument/2006/relationships" xmlns:p="http://schemas.openxmlformats.org/presentationml/2006/main" show="0">
+  <p:cSld>
+    <p:spTree>
+      <p:nvGrpSpPr>
+        <p:cNvPr id="1" name=""/>
+        <p:cNvGrpSpPr/>
+        <p:nvPr/>
+      </p:nvGrpSpPr>
+      <p:grpSpPr>
+        <a:xfrm>
+          <a:off x="0" y="0"/>
+          <a:ext cx="0" cy="0"/>
+          <a:chOff x="0" y="0"/>
+          <a:chExt cx="0" cy="0"/>
+        </a:xfrm>
+      </p:grpSpPr>
+      <p:sp>
+        <p:nvSpPr>
+          <p:cNvPr id="26" name="Textfeld 25">
+            <a:extLst>
+              <a:ext uri="{FF2B5EF4-FFF2-40B4-BE49-F238E27FC236}">
+                <a16:creationId xmlns:a16="http://schemas.microsoft.com/office/drawing/2014/main" id="{E5229098-1146-2BBD-D75D-639ED2A05A0D}"/>
+              </a:ext>
+            </a:extLst>
+          </p:cNvPr>
+          <p:cNvSpPr txBox="1"/>
+          <p:nvPr/>
+        </p:nvSpPr>
+        <p:spPr>
+          <a:xfrm>
+            <a:off x="190156" y="88968"/>
+            <a:ext cx="9352657" cy="523220"/>
+          </a:xfrm>
+          <a:prstGeom prst="rect">
+            <a:avLst/>
+          </a:prstGeom>
+          <a:noFill/>
+        </p:spPr>
+        <p:txBody>
+          <a:bodyPr wrap="square" rtlCol="0">
+            <a:spAutoFit/>
+          </a:bodyPr>
+          <a:lstStyle/>
+          <a:p>
+            <a:pPr algn="ctr"/>
+            <a:r>
+              <a:rPr lang="en-US" sz="2800" b="1" dirty="0" err="1"/>
+              <a:t>UASFRA</a:t>
+            </a:r>
+            <a:r>
+              <a:rPr lang="en-US" sz="2800" b="1" dirty="0"/>
+              <a:t>-MS-</a:t>
+            </a:r>
+            <a:r>
+              <a:rPr lang="en-US" sz="2800" b="1" dirty="0" err="1"/>
+              <a:t>PROJDIGI</a:t>
+            </a:r>
+            <a:r>
+              <a:rPr lang="en-US" sz="2800" b="1" dirty="0"/>
+              <a:t>: Group 4: The plan ahead</a:t>
+            </a:r>
+          </a:p>
+        </p:txBody>
+      </p:sp>
+      <p:pic>
+        <p:nvPicPr>
+          <p:cNvPr id="2052" name="Picture 4">
+            <a:extLst>
+              <a:ext uri="{FF2B5EF4-FFF2-40B4-BE49-F238E27FC236}">
+                <a16:creationId xmlns:a16="http://schemas.microsoft.com/office/drawing/2014/main" id="{2ACE155D-2DDE-B917-7A2F-C0EE29B2328D}"/>
+              </a:ext>
+            </a:extLst>
+          </p:cNvPr>
+          <p:cNvPicPr>
+            <a:picLocks noChangeAspect="1" noChangeArrowheads="1"/>
+          </p:cNvPicPr>
+          <p:nvPr/>
+        </p:nvPicPr>
+        <p:blipFill>
+          <a:blip r:embed="rId2">
+            <a:extLst>
+              <a:ext uri="{28A0092B-C50C-407E-A947-70E740481C1C}">
+                <a14:useLocalDpi xmlns:a14="http://schemas.microsoft.com/office/drawing/2010/main" val="0"/>
+              </a:ext>
+            </a:extLst>
+          </a:blip>
+          <a:srcRect/>
+          <a:stretch>
+            <a:fillRect/>
+          </a:stretch>
+        </p:blipFill>
+        <p:spPr bwMode="auto">
+          <a:xfrm>
+            <a:off x="644499" y="1576062"/>
+            <a:ext cx="8617001" cy="4301596"/>
+          </a:xfrm>
+          <a:prstGeom prst="rect">
+            <a:avLst/>
+          </a:prstGeom>
+          <a:noFill/>
+          <a:ln>
+            <a:solidFill>
+              <a:schemeClr val="accent1"/>
+            </a:solidFill>
+          </a:ln>
+          <a:extLst>
+            <a:ext uri="{909E8E84-426E-40DD-AFC4-6F175D3DCCD1}">
+              <a14:hiddenFill xmlns:a14="http://schemas.microsoft.com/office/drawing/2010/main">
+                <a:solidFill>
+                  <a:srgbClr val="FFFFFF"/>
+                </a:solidFill>
+              </a14:hiddenFill>
+            </a:ext>
+          </a:extLst>
+        </p:spPr>
+      </p:pic>
+      <p:sp>
+        <p:nvSpPr>
+          <p:cNvPr id="3" name="Textfeld 2">
+            <a:extLst>
+              <a:ext uri="{FF2B5EF4-FFF2-40B4-BE49-F238E27FC236}">
+                <a16:creationId xmlns:a16="http://schemas.microsoft.com/office/drawing/2014/main" id="{5802FE33-C0F4-176F-D49C-BB740DF8ED0E}"/>
+              </a:ext>
+            </a:extLst>
+          </p:cNvPr>
+          <p:cNvSpPr txBox="1"/>
+          <p:nvPr/>
+        </p:nvSpPr>
+        <p:spPr>
+          <a:xfrm>
+            <a:off x="1665350" y="1004792"/>
+            <a:ext cx="6669757" cy="369332"/>
+          </a:xfrm>
+          <a:prstGeom prst="rect">
+            <a:avLst/>
+          </a:prstGeom>
+          <a:noFill/>
+        </p:spPr>
+        <p:txBody>
+          <a:bodyPr wrap="square" rtlCol="0">
+            <a:spAutoFit/>
+          </a:bodyPr>
+          <a:lstStyle/>
+          <a:p>
+            <a:r>
+              <a:rPr lang="de-DE" b="1" i="0" dirty="0">
+                <a:solidFill>
+                  <a:srgbClr val="242424"/>
+                </a:solidFill>
+                <a:effectLst/>
+                <a:latin typeface="sohne"/>
+              </a:rPr>
+              <a:t>Query </a:t>
+            </a:r>
+            <a:r>
+              <a:rPr lang="de-DE" b="1" i="0" dirty="0" err="1">
+                <a:solidFill>
+                  <a:srgbClr val="242424"/>
+                </a:solidFill>
+                <a:effectLst/>
+                <a:latin typeface="sohne"/>
+              </a:rPr>
+              <a:t>similar</a:t>
+            </a:r>
+            <a:r>
+              <a:rPr lang="de-DE" b="1" i="0" dirty="0">
+                <a:solidFill>
+                  <a:srgbClr val="242424"/>
+                </a:solidFill>
+                <a:effectLst/>
+                <a:latin typeface="sohne"/>
+              </a:rPr>
+              <a:t> </a:t>
+            </a:r>
+            <a:r>
+              <a:rPr lang="de-DE" b="1" i="0" dirty="0" err="1">
+                <a:solidFill>
+                  <a:srgbClr val="242424"/>
+                </a:solidFill>
+                <a:effectLst/>
+                <a:latin typeface="sohne"/>
+              </a:rPr>
+              <a:t>to</a:t>
+            </a:r>
+            <a:r>
+              <a:rPr lang="de-DE" b="1" dirty="0">
+                <a:solidFill>
+                  <a:srgbClr val="242424"/>
+                </a:solidFill>
+                <a:latin typeface="sohne"/>
+              </a:rPr>
+              <a:t>:</a:t>
+            </a:r>
+            <a:r>
+              <a:rPr lang="de-DE" b="1" i="0" dirty="0">
+                <a:solidFill>
+                  <a:srgbClr val="242424"/>
+                </a:solidFill>
+                <a:effectLst/>
+                <a:latin typeface="sohne"/>
+              </a:rPr>
+              <a:t> Retrieval-</a:t>
+            </a:r>
+            <a:r>
+              <a:rPr lang="de-DE" b="1" i="0" dirty="0" err="1">
+                <a:solidFill>
+                  <a:srgbClr val="242424"/>
+                </a:solidFill>
+                <a:effectLst/>
+                <a:latin typeface="sohne"/>
+              </a:rPr>
+              <a:t>Augmented</a:t>
+            </a:r>
+            <a:r>
+              <a:rPr lang="de-DE" b="1" i="0" dirty="0">
+                <a:solidFill>
+                  <a:srgbClr val="242424"/>
+                </a:solidFill>
+                <a:effectLst/>
+                <a:latin typeface="sohne"/>
+              </a:rPr>
+              <a:t> Question-</a:t>
+            </a:r>
+            <a:r>
+              <a:rPr lang="de-DE" b="1" i="0" dirty="0" err="1">
+                <a:solidFill>
+                  <a:srgbClr val="242424"/>
+                </a:solidFill>
+                <a:effectLst/>
+                <a:latin typeface="sohne"/>
+              </a:rPr>
+              <a:t>Answering</a:t>
+            </a:r>
+            <a:r>
+              <a:rPr lang="de-DE" b="1" i="0" dirty="0">
+                <a:solidFill>
+                  <a:srgbClr val="242424"/>
+                </a:solidFill>
+                <a:effectLst/>
+                <a:latin typeface="sohne"/>
+              </a:rPr>
+              <a:t> </a:t>
+            </a:r>
+            <a:r>
+              <a:rPr lang="de-DE" b="1" i="0" dirty="0" err="1">
+                <a:solidFill>
+                  <a:srgbClr val="242424"/>
+                </a:solidFill>
+                <a:effectLst/>
+                <a:latin typeface="sohne"/>
+              </a:rPr>
+              <a:t>LLMs</a:t>
+            </a:r>
+            <a:r>
+              <a:rPr lang="de-DE" b="1" i="0" dirty="0">
+                <a:solidFill>
+                  <a:srgbClr val="242424"/>
+                </a:solidFill>
+                <a:effectLst/>
+                <a:latin typeface="sohne"/>
+              </a:rPr>
+              <a:t>:</a:t>
+            </a:r>
+          </a:p>
+        </p:txBody>
+      </p:sp>
+      <p:sp>
+        <p:nvSpPr>
+          <p:cNvPr id="4" name="Multiplikationszeichen 3">
+            <a:extLst>
+              <a:ext uri="{FF2B5EF4-FFF2-40B4-BE49-F238E27FC236}">
+                <a16:creationId xmlns:a16="http://schemas.microsoft.com/office/drawing/2014/main" id="{DD8DF273-C792-1015-D1DE-20A5DE6748DD}"/>
+              </a:ext>
+            </a:extLst>
+          </p:cNvPr>
+          <p:cNvSpPr/>
+          <p:nvPr/>
+        </p:nvSpPr>
+        <p:spPr>
+          <a:xfrm>
+            <a:off x="4580793" y="1393636"/>
+            <a:ext cx="1806819" cy="1850781"/>
+          </a:xfrm>
+          <a:prstGeom prst="mathMultiply">
+            <a:avLst/>
+          </a:prstGeom>
+          <a:solidFill>
+            <a:srgbClr val="FF0000"/>
+          </a:solidFill>
+        </p:spPr>
+        <p:style>
+          <a:lnRef idx="2">
+            <a:schemeClr val="accent1">
+              <a:shade val="15000"/>
+            </a:schemeClr>
+          </a:lnRef>
+          <a:fillRef idx="1">
+            <a:schemeClr val="accent1"/>
+          </a:fillRef>
+          <a:effectRef idx="0">
+            <a:schemeClr val="accent1"/>
+          </a:effectRef>
+          <a:fontRef idx="minor">
+            <a:schemeClr val="lt1"/>
+          </a:fontRef>
+        </p:style>
+        <p:txBody>
+          <a:bodyPr rtlCol="0" anchor="ctr"/>
+          <a:lstStyle/>
+          <a:p>
+            <a:pPr algn="ctr"/>
+            <a:endParaRPr lang="en-US"/>
+          </a:p>
+        </p:txBody>
+      </p:sp>
+      <p:sp>
+        <p:nvSpPr>
+          <p:cNvPr id="5" name="Multiplikationszeichen 4">
+            <a:extLst>
+              <a:ext uri="{FF2B5EF4-FFF2-40B4-BE49-F238E27FC236}">
+                <a16:creationId xmlns:a16="http://schemas.microsoft.com/office/drawing/2014/main" id="{AABB67CD-79EC-0A26-3568-2D7B0086D642}"/>
+              </a:ext>
+            </a:extLst>
+          </p:cNvPr>
+          <p:cNvSpPr/>
+          <p:nvPr/>
+        </p:nvSpPr>
+        <p:spPr>
+          <a:xfrm>
+            <a:off x="6843347" y="1357001"/>
+            <a:ext cx="1806819" cy="1850781"/>
+          </a:xfrm>
+          <a:prstGeom prst="mathMultiply">
+            <a:avLst/>
+          </a:prstGeom>
+          <a:solidFill>
+            <a:srgbClr val="FF0000"/>
+          </a:solidFill>
+        </p:spPr>
+        <p:style>
+          <a:lnRef idx="2">
+            <a:schemeClr val="accent1">
+              <a:shade val="15000"/>
+            </a:schemeClr>
+          </a:lnRef>
+          <a:fillRef idx="1">
+            <a:schemeClr val="accent1"/>
+          </a:fillRef>
+          <a:effectRef idx="0">
+            <a:schemeClr val="accent1"/>
+          </a:effectRef>
+          <a:fontRef idx="minor">
+            <a:schemeClr val="lt1"/>
+          </a:fontRef>
+        </p:style>
+        <p:txBody>
+          <a:bodyPr rtlCol="0" anchor="ctr"/>
+          <a:lstStyle/>
+          <a:p>
+            <a:pPr algn="ctr"/>
+            <a:endParaRPr lang="en-US"/>
+          </a:p>
+        </p:txBody>
+      </p:sp>
+      <p:sp>
+        <p:nvSpPr>
+          <p:cNvPr id="8" name="Rechteck 7">
+            <a:extLst>
+              <a:ext uri="{FF2B5EF4-FFF2-40B4-BE49-F238E27FC236}">
+                <a16:creationId xmlns:a16="http://schemas.microsoft.com/office/drawing/2014/main" id="{09D1B4C3-87BE-79DB-CFF5-7AF54748A721}"/>
+              </a:ext>
+            </a:extLst>
+          </p:cNvPr>
+          <p:cNvSpPr/>
+          <p:nvPr/>
+        </p:nvSpPr>
+        <p:spPr>
+          <a:xfrm>
+            <a:off x="4079295" y="3552092"/>
+            <a:ext cx="730097" cy="518747"/>
+          </a:xfrm>
+          <a:prstGeom prst="rect">
+            <a:avLst/>
+          </a:prstGeom>
+          <a:solidFill>
+            <a:schemeClr val="bg1"/>
+          </a:solidFill>
+          <a:ln>
+            <a:noFill/>
+          </a:ln>
+        </p:spPr>
+        <p:style>
+          <a:lnRef idx="2">
+            <a:schemeClr val="accent1">
+              <a:shade val="15000"/>
+            </a:schemeClr>
+          </a:lnRef>
+          <a:fillRef idx="1">
+            <a:schemeClr val="accent1"/>
+          </a:fillRef>
+          <a:effectRef idx="0">
+            <a:schemeClr val="accent1"/>
+          </a:effectRef>
+          <a:fontRef idx="minor">
+            <a:schemeClr val="lt1"/>
+          </a:fontRef>
+        </p:style>
+        <p:txBody>
+          <a:bodyPr rtlCol="0" anchor="ctr"/>
+          <a:lstStyle/>
+          <a:p>
+            <a:pPr algn="ctr"/>
+            <a:endParaRPr lang="en-US"/>
+          </a:p>
+        </p:txBody>
+      </p:sp>
+      <p:pic>
+        <p:nvPicPr>
+          <p:cNvPr id="7" name="Grafik 6">
+            <a:extLst>
+              <a:ext uri="{FF2B5EF4-FFF2-40B4-BE49-F238E27FC236}">
+                <a16:creationId xmlns:a16="http://schemas.microsoft.com/office/drawing/2014/main" id="{B945CF0E-F9A8-83CA-59F2-04CD320208AD}"/>
+              </a:ext>
+            </a:extLst>
+          </p:cNvPr>
+          <p:cNvPicPr>
+            <a:picLocks noChangeAspect="1"/>
+          </p:cNvPicPr>
+          <p:nvPr/>
+        </p:nvPicPr>
+        <p:blipFill>
+          <a:blip r:embed="rId3"/>
+          <a:stretch>
+            <a:fillRect/>
+          </a:stretch>
+        </p:blipFill>
+        <p:spPr>
+          <a:xfrm rot="5400000">
+            <a:off x="2346000" y="3909228"/>
+            <a:ext cx="3906853" cy="468129"/>
+          </a:xfrm>
+          <a:prstGeom prst="rect">
+            <a:avLst/>
+          </a:prstGeom>
+        </p:spPr>
+      </p:pic>
+      <p:pic>
+        <p:nvPicPr>
+          <p:cNvPr id="10" name="Grafik 9">
+            <a:extLst>
+              <a:ext uri="{FF2B5EF4-FFF2-40B4-BE49-F238E27FC236}">
+                <a16:creationId xmlns:a16="http://schemas.microsoft.com/office/drawing/2014/main" id="{12D8C6C6-FCFC-65C8-AD0E-2C12EF5279EE}"/>
+              </a:ext>
+            </a:extLst>
+          </p:cNvPr>
+          <p:cNvPicPr>
+            <a:picLocks noChangeAspect="1"/>
+          </p:cNvPicPr>
+          <p:nvPr/>
+        </p:nvPicPr>
+        <p:blipFill>
+          <a:blip r:embed="rId4"/>
+          <a:stretch>
+            <a:fillRect/>
+          </a:stretch>
+        </p:blipFill>
+        <p:spPr>
+          <a:xfrm>
+            <a:off x="1454779" y="1596250"/>
+            <a:ext cx="2670279" cy="493819"/>
+          </a:xfrm>
+          <a:prstGeom prst="rect">
+            <a:avLst/>
+          </a:prstGeom>
+        </p:spPr>
+      </p:pic>
+      <p:sp>
+        <p:nvSpPr>
+          <p:cNvPr id="13" name="Rechteck 12">
+            <a:extLst>
+              <a:ext uri="{FF2B5EF4-FFF2-40B4-BE49-F238E27FC236}">
+                <a16:creationId xmlns:a16="http://schemas.microsoft.com/office/drawing/2014/main" id="{96A874B8-BFA4-6CF8-7705-9387D9CC95D5}"/>
+              </a:ext>
+            </a:extLst>
+          </p:cNvPr>
+          <p:cNvSpPr/>
+          <p:nvPr/>
+        </p:nvSpPr>
+        <p:spPr>
+          <a:xfrm>
+            <a:off x="2595873" y="3417661"/>
+            <a:ext cx="730097" cy="518747"/>
+          </a:xfrm>
+          <a:prstGeom prst="rect">
+            <a:avLst/>
+          </a:prstGeom>
+          <a:solidFill>
+            <a:schemeClr val="bg1"/>
+          </a:solidFill>
+          <a:ln>
+            <a:noFill/>
+          </a:ln>
+        </p:spPr>
+        <p:style>
+          <a:lnRef idx="2">
+            <a:schemeClr val="accent1">
+              <a:shade val="15000"/>
+            </a:schemeClr>
+          </a:lnRef>
+          <a:fillRef idx="1">
+            <a:schemeClr val="accent1"/>
+          </a:fillRef>
+          <a:effectRef idx="0">
+            <a:schemeClr val="accent1"/>
+          </a:effectRef>
+          <a:fontRef idx="minor">
+            <a:schemeClr val="lt1"/>
+          </a:fontRef>
+        </p:style>
+        <p:txBody>
+          <a:bodyPr rtlCol="0" anchor="ctr"/>
+          <a:lstStyle/>
+          <a:p>
+            <a:pPr algn="ctr"/>
+            <a:endParaRPr lang="en-US"/>
+          </a:p>
+        </p:txBody>
+      </p:sp>
+      <p:pic>
+        <p:nvPicPr>
+          <p:cNvPr id="12" name="Grafik 11">
+            <a:extLst>
+              <a:ext uri="{FF2B5EF4-FFF2-40B4-BE49-F238E27FC236}">
+                <a16:creationId xmlns:a16="http://schemas.microsoft.com/office/drawing/2014/main" id="{BF2FA10C-C09E-BCBA-F6EC-56C8DB8FF63B}"/>
+              </a:ext>
+            </a:extLst>
+          </p:cNvPr>
+          <p:cNvPicPr>
+            <a:picLocks noChangeAspect="1"/>
+          </p:cNvPicPr>
+          <p:nvPr/>
+        </p:nvPicPr>
+        <p:blipFill>
+          <a:blip r:embed="rId5"/>
+          <a:stretch>
+            <a:fillRect/>
+          </a:stretch>
+        </p:blipFill>
+        <p:spPr>
+          <a:xfrm rot="5400000">
+            <a:off x="1829876" y="3639120"/>
+            <a:ext cx="2377646" cy="493819"/>
+          </a:xfrm>
+          <a:prstGeom prst="rect">
+            <a:avLst/>
+          </a:prstGeom>
+        </p:spPr>
+      </p:pic>
+    </p:spTree>
+    <p:extLst>
+      <p:ext uri="{BB962C8B-B14F-4D97-AF65-F5344CB8AC3E}">
+        <p14:creationId xmlns:p14="http://schemas.microsoft.com/office/powerpoint/2010/main" val="3729833070"/>
+      </p:ext>
+    </p:extLst>
+  </p:cSld>
+  <p:clrMapOvr>
+    <a:masterClrMapping/>
+  </p:clrMapOvr>
+</p:sld>
+</file>
+
+<file path=ppt/slides/slide5.xml><?xml version="1.0" encoding="utf-8"?>
+<p:sld xmlns:a="http://schemas.openxmlformats.org/drawingml/2006/main" xmlns:r="http://schemas.openxmlformats.org/officeDocument/2006/relationships" xmlns:p="http://schemas.openxmlformats.org/presentationml/2006/main" show="0">
+  <p:cSld>
+    <p:spTree>
+      <p:nvGrpSpPr>
+        <p:cNvPr id="1" name=""/>
+        <p:cNvGrpSpPr/>
+        <p:nvPr/>
+      </p:nvGrpSpPr>
+      <p:grpSpPr>
+        <a:xfrm>
+          <a:off x="0" y="0"/>
+          <a:ext cx="0" cy="0"/>
+          <a:chOff x="0" y="0"/>
+          <a:chExt cx="0" cy="0"/>
+        </a:xfrm>
+      </p:grpSpPr>
+      <p:sp>
+        <p:nvSpPr>
+          <p:cNvPr id="26" name="Textfeld 25">
+            <a:extLst>
+              <a:ext uri="{FF2B5EF4-FFF2-40B4-BE49-F238E27FC236}">
+                <a16:creationId xmlns:a16="http://schemas.microsoft.com/office/drawing/2014/main" id="{E5229098-1146-2BBD-D75D-639ED2A05A0D}"/>
+              </a:ext>
+            </a:extLst>
+          </p:cNvPr>
+          <p:cNvSpPr txBox="1"/>
+          <p:nvPr/>
+        </p:nvSpPr>
+        <p:spPr>
+          <a:xfrm>
+            <a:off x="190156" y="88968"/>
+            <a:ext cx="9352657" cy="523220"/>
+          </a:xfrm>
+          <a:prstGeom prst="rect">
+            <a:avLst/>
+          </a:prstGeom>
+          <a:noFill/>
+        </p:spPr>
+        <p:txBody>
+          <a:bodyPr wrap="square" rtlCol="0">
+            <a:spAutoFit/>
+          </a:bodyPr>
+          <a:lstStyle/>
+          <a:p>
+            <a:pPr algn="ctr"/>
+            <a:r>
+              <a:rPr lang="en-US" sz="2800" b="1" dirty="0" err="1"/>
+              <a:t>UASFRA</a:t>
+            </a:r>
+            <a:r>
+              <a:rPr lang="en-US" sz="2800" b="1" dirty="0"/>
+              <a:t>-MS-</a:t>
+            </a:r>
+            <a:r>
+              <a:rPr lang="en-US" sz="2800" b="1" dirty="0" err="1"/>
+              <a:t>PROJDIGI</a:t>
+            </a:r>
+            <a:r>
+              <a:rPr lang="en-US" sz="2800" b="1" dirty="0"/>
+              <a:t>: Group 4: The plan ahead</a:t>
+            </a:r>
+          </a:p>
+        </p:txBody>
+      </p:sp>
+      <p:pic>
+        <p:nvPicPr>
+          <p:cNvPr id="1026" name="Picture 2" descr="Example sequence diagram of KG creation could look like">
+            <a:extLst>
+              <a:ext uri="{FF2B5EF4-FFF2-40B4-BE49-F238E27FC236}">
+                <a16:creationId xmlns:a16="http://schemas.microsoft.com/office/drawing/2014/main" id="{D4E0178C-1400-E4B5-BA5A-4C68D8F32924}"/>
+              </a:ext>
+            </a:extLst>
+          </p:cNvPr>
+          <p:cNvPicPr>
+            <a:picLocks noChangeAspect="1" noChangeArrowheads="1"/>
+          </p:cNvPicPr>
+          <p:nvPr/>
+        </p:nvPicPr>
+        <p:blipFill>
+          <a:blip r:embed="rId2">
+            <a:extLst>
+              <a:ext uri="{28A0092B-C50C-407E-A947-70E740481C1C}">
+                <a14:useLocalDpi xmlns:a14="http://schemas.microsoft.com/office/drawing/2010/main" val="0"/>
+              </a:ext>
+            </a:extLst>
+          </a:blip>
+          <a:srcRect/>
+          <a:stretch>
+            <a:fillRect/>
+          </a:stretch>
+        </p:blipFill>
+        <p:spPr bwMode="auto">
+          <a:xfrm>
+            <a:off x="646232" y="867932"/>
+            <a:ext cx="8827669" cy="5409776"/>
+          </a:xfrm>
+          <a:prstGeom prst="rect">
+            <a:avLst/>
+          </a:prstGeom>
+          <a:noFill/>
+          <a:extLst>
+            <a:ext uri="{909E8E84-426E-40DD-AFC4-6F175D3DCCD1}">
+              <a14:hiddenFill xmlns:a14="http://schemas.microsoft.com/office/drawing/2010/main">
+                <a:solidFill>
+                  <a:srgbClr val="FFFFFF"/>
+                </a:solidFill>
+              </a14:hiddenFill>
+            </a:ext>
+          </a:extLst>
+        </p:spPr>
+      </p:pic>
+      <p:pic>
+        <p:nvPicPr>
+          <p:cNvPr id="2" name="Grafik 1" descr="Ein Bild, das Text, Screenshot, Software, Schrift enthält.&#10;&#10;Automatisch generierte Beschreibung">
+            <a:extLst>
+              <a:ext uri="{FF2B5EF4-FFF2-40B4-BE49-F238E27FC236}">
+                <a16:creationId xmlns:a16="http://schemas.microsoft.com/office/drawing/2014/main" id="{B6AAF69F-9EF3-5CB7-83BC-D62A45F40C29}"/>
+              </a:ext>
+            </a:extLst>
+          </p:cNvPr>
+          <p:cNvPicPr>
+            <a:picLocks noChangeAspect="1"/>
+          </p:cNvPicPr>
+          <p:nvPr/>
+        </p:nvPicPr>
+        <p:blipFill rotWithShape="1">
+          <a:blip r:embed="rId3"/>
+          <a:srcRect l="786" t="10338" r="93157" b="85125"/>
+          <a:stretch/>
+        </p:blipFill>
+        <p:spPr bwMode="auto">
+          <a:xfrm>
+            <a:off x="5860073" y="1646242"/>
+            <a:ext cx="1323244" cy="531584"/>
+          </a:xfrm>
+          <a:prstGeom prst="rect">
+            <a:avLst/>
+          </a:prstGeom>
+          <a:ln>
+            <a:noFill/>
+          </a:ln>
+          <a:extLst>
+            <a:ext uri="{53640926-AAD7-44D8-BBD7-CCE9431645EC}">
+              <a14:shadowObscured xmlns:a14="http://schemas.microsoft.com/office/drawing/2010/main"/>
+            </a:ext>
+          </a:extLst>
+        </p:spPr>
+      </p:pic>
+    </p:spTree>
+    <p:extLst>
+      <p:ext uri="{BB962C8B-B14F-4D97-AF65-F5344CB8AC3E}">
+        <p14:creationId xmlns:p14="http://schemas.microsoft.com/office/powerpoint/2010/main" val="1359376255"/>
       </p:ext>
     </p:extLst>
   </p:cSld>

</xml_diff>